<commit_message>
fix: remove unnecessary border
</commit_message>
<xml_diff>
--- a/Tableau-Antibiotics.pptx
+++ b/Tableau-Antibiotics.pptx
@@ -3327,7 +3327,7 @@
           <p:cNvPr id="0" name="slide1">
             <a:extLst>
               <a:ext uri="{FF2B5EF4-FFF2-40B4-BE49-F238E27FC236}">
-                <a16:creationId xmlns:a16="http://schemas.microsoft.com/office/drawing/2014/main" id="{53CE8487-20B9-4BA5-B30F-C5DDA18B9F26}"/>
+                <a16:creationId xmlns:a16="http://schemas.microsoft.com/office/drawing/2014/main" id="{23A9C712-6BB0-4856-8117-F5D5B158B5BC}"/>
               </a:ext>
             </a:extLst>
           </p:cNvPr>
@@ -3355,7 +3355,7 @@
           <p:cNvPr id="1" name="slide1">
             <a:extLst>
               <a:ext uri="{FF2B5EF4-FFF2-40B4-BE49-F238E27FC236}">
-                <a16:creationId xmlns:a16="http://schemas.microsoft.com/office/drawing/2014/main" id="{7A6E810E-9E0C-4337-9FA5-413EBAC33C44}"/>
+                <a16:creationId xmlns:a16="http://schemas.microsoft.com/office/drawing/2014/main" id="{6B57FF11-C942-41BD-A6D3-08D6D52650CD}"/>
               </a:ext>
             </a:extLst>
           </p:cNvPr>
@@ -3373,7 +3373,7 @@
           <a:p>
             <a:r>
               <a:rPr/>
-              <a:t>File created on: 9/23/21 12:48:26 AM CDT</a:t>
+              <a:t>File created on: 9/23/21 12:51:06 AM CDT</a:t>
             </a:r>
           </a:p>
         </p:txBody>
@@ -3413,7 +3413,7 @@
           <p:cNvPr descr="Dashboard 1" id="2" name="slide2">
             <a:extLst>
               <a:ext uri="{FF2B5EF4-FFF2-40B4-BE49-F238E27FC236}">
-                <a16:creationId xmlns:a16="http://schemas.microsoft.com/office/drawing/2014/main" id="{A9C2549F-92E4-4296-AE41-E4C8647EACA4}"/>
+                <a16:creationId xmlns:a16="http://schemas.microsoft.com/office/drawing/2014/main" id="{5090299A-4CE3-4A97-9EA7-0308AA65DA29}"/>
               </a:ext>
             </a:extLst>
           </p:cNvPr>

</xml_diff>